<commit_message>
three coil - current sharing
</commit_message>
<xml_diff>
--- a/WPT/3-coil/experiment-results-tubitak/Tubitak-Final Rapor.pptx
+++ b/WPT/3-coil/experiment-results-tubitak/Tubitak-Final Rapor.pptx
@@ -10,6 +10,10 @@
     <p:sldId id="258" r:id="rId4"/>
     <p:sldId id="259" r:id="rId5"/>
     <p:sldId id="260" r:id="rId6"/>
+    <p:sldId id="261" r:id="rId7"/>
+    <p:sldId id="262" r:id="rId8"/>
+    <p:sldId id="263" r:id="rId9"/>
+    <p:sldId id="264" r:id="rId10"/>
   </p:sldIdLst>
   <p:sldSz cx="12192000" cy="6858000"/>
   <p:notesSz cx="6858000" cy="9144000"/>
@@ -108,6 +112,11 @@
       </a:defRPr>
     </a:lvl9pPr>
   </p:defaultTextStyle>
+  <p:extLst>
+    <p:ext uri="{EFAFB233-063F-42B5-8137-9DF3F51BA10A}">
+      <p15:sldGuideLst xmlns:p15="http://schemas.microsoft.com/office/powerpoint/2012/main"/>
+    </p:ext>
+  </p:extLst>
 </p:presentation>
 </file>
 
@@ -258,7 +267,7 @@
           <a:p>
             <a:fld id="{2DE90549-F11B-4CB4-B09F-100406ABADBE}" type="datetimeFigureOut">
               <a:rPr lang="en-US" smtClean="0"/>
-              <a:t>2/16/2022</a:t>
+              <a:t>4/18/2022</a:t>
             </a:fld>
             <a:endParaRPr lang="en-US"/>
           </a:p>
@@ -456,7 +465,7 @@
           <a:p>
             <a:fld id="{2DE90549-F11B-4CB4-B09F-100406ABADBE}" type="datetimeFigureOut">
               <a:rPr lang="en-US" smtClean="0"/>
-              <a:t>2/16/2022</a:t>
+              <a:t>4/18/2022</a:t>
             </a:fld>
             <a:endParaRPr lang="en-US"/>
           </a:p>
@@ -664,7 +673,7 @@
           <a:p>
             <a:fld id="{2DE90549-F11B-4CB4-B09F-100406ABADBE}" type="datetimeFigureOut">
               <a:rPr lang="en-US" smtClean="0"/>
-              <a:t>2/16/2022</a:t>
+              <a:t>4/18/2022</a:t>
             </a:fld>
             <a:endParaRPr lang="en-US"/>
           </a:p>
@@ -862,7 +871,7 @@
           <a:p>
             <a:fld id="{2DE90549-F11B-4CB4-B09F-100406ABADBE}" type="datetimeFigureOut">
               <a:rPr lang="en-US" smtClean="0"/>
-              <a:t>2/16/2022</a:t>
+              <a:t>4/18/2022</a:t>
             </a:fld>
             <a:endParaRPr lang="en-US"/>
           </a:p>
@@ -1137,7 +1146,7 @@
           <a:p>
             <a:fld id="{2DE90549-F11B-4CB4-B09F-100406ABADBE}" type="datetimeFigureOut">
               <a:rPr lang="en-US" smtClean="0"/>
-              <a:t>2/16/2022</a:t>
+              <a:t>4/18/2022</a:t>
             </a:fld>
             <a:endParaRPr lang="en-US"/>
           </a:p>
@@ -1402,7 +1411,7 @@
           <a:p>
             <a:fld id="{2DE90549-F11B-4CB4-B09F-100406ABADBE}" type="datetimeFigureOut">
               <a:rPr lang="en-US" smtClean="0"/>
-              <a:t>2/16/2022</a:t>
+              <a:t>4/18/2022</a:t>
             </a:fld>
             <a:endParaRPr lang="en-US"/>
           </a:p>
@@ -1814,7 +1823,7 @@
           <a:p>
             <a:fld id="{2DE90549-F11B-4CB4-B09F-100406ABADBE}" type="datetimeFigureOut">
               <a:rPr lang="en-US" smtClean="0"/>
-              <a:t>2/16/2022</a:t>
+              <a:t>4/18/2022</a:t>
             </a:fld>
             <a:endParaRPr lang="en-US"/>
           </a:p>
@@ -1955,7 +1964,7 @@
           <a:p>
             <a:fld id="{2DE90549-F11B-4CB4-B09F-100406ABADBE}" type="datetimeFigureOut">
               <a:rPr lang="en-US" smtClean="0"/>
-              <a:t>2/16/2022</a:t>
+              <a:t>4/18/2022</a:t>
             </a:fld>
             <a:endParaRPr lang="en-US"/>
           </a:p>
@@ -2068,7 +2077,7 @@
           <a:p>
             <a:fld id="{2DE90549-F11B-4CB4-B09F-100406ABADBE}" type="datetimeFigureOut">
               <a:rPr lang="en-US" smtClean="0"/>
-              <a:t>2/16/2022</a:t>
+              <a:t>4/18/2022</a:t>
             </a:fld>
             <a:endParaRPr lang="en-US"/>
           </a:p>
@@ -2379,7 +2388,7 @@
           <a:p>
             <a:fld id="{2DE90549-F11B-4CB4-B09F-100406ABADBE}" type="datetimeFigureOut">
               <a:rPr lang="en-US" smtClean="0"/>
-              <a:t>2/16/2022</a:t>
+              <a:t>4/18/2022</a:t>
             </a:fld>
             <a:endParaRPr lang="en-US"/>
           </a:p>
@@ -2667,7 +2676,7 @@
           <a:p>
             <a:fld id="{2DE90549-F11B-4CB4-B09F-100406ABADBE}" type="datetimeFigureOut">
               <a:rPr lang="en-US" smtClean="0"/>
-              <a:t>2/16/2022</a:t>
+              <a:t>4/18/2022</a:t>
             </a:fld>
             <a:endParaRPr lang="en-US"/>
           </a:p>
@@ -2908,7 +2917,7 @@
           <a:p>
             <a:fld id="{2DE90549-F11B-4CB4-B09F-100406ABADBE}" type="datetimeFigureOut">
               <a:rPr lang="en-US" smtClean="0"/>
-              <a:t>2/16/2022</a:t>
+              <a:t>4/18/2022</a:t>
             </a:fld>
             <a:endParaRPr lang="en-US"/>
           </a:p>
@@ -3870,6 +3879,402 @@
 </p:sld>
 </file>
 
+<file path=ppt/slides/slide6.xml><?xml version="1.0" encoding="utf-8"?>
+<p:sld xmlns:a="http://schemas.openxmlformats.org/drawingml/2006/main" xmlns:r="http://schemas.openxmlformats.org/officeDocument/2006/relationships" xmlns:p="http://schemas.openxmlformats.org/presentationml/2006/main">
+  <p:cSld>
+    <p:spTree>
+      <p:nvGrpSpPr>
+        <p:cNvPr id="1" name=""/>
+        <p:cNvGrpSpPr/>
+        <p:nvPr/>
+      </p:nvGrpSpPr>
+      <p:grpSpPr>
+        <a:xfrm>
+          <a:off x="0" y="0"/>
+          <a:ext cx="0" cy="0"/>
+          <a:chOff x="0" y="0"/>
+          <a:chExt cx="0" cy="0"/>
+        </a:xfrm>
+      </p:grpSpPr>
+      <p:pic>
+        <p:nvPicPr>
+          <p:cNvPr id="2" name="Picture 1">
+            <a:extLst>
+              <a:ext uri="{FF2B5EF4-FFF2-40B4-BE49-F238E27FC236}">
+                <a16:creationId xmlns:a16="http://schemas.microsoft.com/office/drawing/2014/main" id="{F322D709-941F-4EAE-AF42-BD8C742F7405}"/>
+              </a:ext>
+            </a:extLst>
+          </p:cNvPr>
+          <p:cNvPicPr>
+            <a:picLocks noChangeAspect="1"/>
+          </p:cNvPicPr>
+          <p:nvPr/>
+        </p:nvPicPr>
+        <p:blipFill>
+          <a:blip r:embed="rId2"/>
+          <a:stretch>
+            <a:fillRect/>
+          </a:stretch>
+        </p:blipFill>
+        <p:spPr>
+          <a:xfrm>
+            <a:off x="225428" y="1401839"/>
+            <a:ext cx="6522880" cy="4846561"/>
+          </a:xfrm>
+          <a:prstGeom prst="rect">
+            <a:avLst/>
+          </a:prstGeom>
+        </p:spPr>
+      </p:pic>
+      <p:pic>
+        <p:nvPicPr>
+          <p:cNvPr id="3" name="Picture 2">
+            <a:extLst>
+              <a:ext uri="{FF2B5EF4-FFF2-40B4-BE49-F238E27FC236}">
+                <a16:creationId xmlns:a16="http://schemas.microsoft.com/office/drawing/2014/main" id="{413EF088-9503-46BF-9D85-3A8765708D60}"/>
+              </a:ext>
+            </a:extLst>
+          </p:cNvPr>
+          <p:cNvPicPr>
+            <a:picLocks noChangeAspect="1"/>
+          </p:cNvPicPr>
+          <p:nvPr/>
+        </p:nvPicPr>
+        <p:blipFill>
+          <a:blip r:embed="rId3"/>
+          <a:stretch>
+            <a:fillRect/>
+          </a:stretch>
+        </p:blipFill>
+        <p:spPr>
+          <a:xfrm>
+            <a:off x="6748308" y="1825804"/>
+            <a:ext cx="5026585" cy="3374625"/>
+          </a:xfrm>
+          <a:prstGeom prst="rect">
+            <a:avLst/>
+          </a:prstGeom>
+        </p:spPr>
+      </p:pic>
+      <p:cxnSp>
+        <p:nvCxnSpPr>
+          <p:cNvPr id="15" name="Straight Arrow Connector 14">
+            <a:extLst>
+              <a:ext uri="{FF2B5EF4-FFF2-40B4-BE49-F238E27FC236}">
+                <a16:creationId xmlns:a16="http://schemas.microsoft.com/office/drawing/2014/main" id="{8188C1ED-5915-4AB5-BD21-73FDAA5B77C0}"/>
+              </a:ext>
+            </a:extLst>
+          </p:cNvPr>
+          <p:cNvCxnSpPr>
+            <a:cxnSpLocks/>
+          </p:cNvCxnSpPr>
+          <p:nvPr/>
+        </p:nvCxnSpPr>
+        <p:spPr>
+          <a:xfrm>
+            <a:off x="9299700" y="1104900"/>
+            <a:ext cx="0" cy="799833"/>
+          </a:xfrm>
+          <a:prstGeom prst="straightConnector1">
+            <a:avLst/>
+          </a:prstGeom>
+          <a:ln w="19050">
+            <a:solidFill>
+              <a:schemeClr val="tx1"/>
+            </a:solidFill>
+            <a:tailEnd type="triangle"/>
+          </a:ln>
+        </p:spPr>
+        <p:style>
+          <a:lnRef idx="1">
+            <a:schemeClr val="accent1"/>
+          </a:lnRef>
+          <a:fillRef idx="0">
+            <a:schemeClr val="accent1"/>
+          </a:fillRef>
+          <a:effectRef idx="0">
+            <a:schemeClr val="accent1"/>
+          </a:effectRef>
+          <a:fontRef idx="minor">
+            <a:schemeClr val="tx1"/>
+          </a:fontRef>
+        </p:style>
+      </p:cxnSp>
+      <p:cxnSp>
+        <p:nvCxnSpPr>
+          <p:cNvPr id="17" name="Straight Arrow Connector 16">
+            <a:extLst>
+              <a:ext uri="{FF2B5EF4-FFF2-40B4-BE49-F238E27FC236}">
+                <a16:creationId xmlns:a16="http://schemas.microsoft.com/office/drawing/2014/main" id="{87C2E28E-EBC5-4503-B824-BEF4A2155420}"/>
+              </a:ext>
+            </a:extLst>
+          </p:cNvPr>
+          <p:cNvCxnSpPr>
+            <a:cxnSpLocks/>
+          </p:cNvCxnSpPr>
+          <p:nvPr/>
+        </p:nvCxnSpPr>
+        <p:spPr>
+          <a:xfrm>
+            <a:off x="3016095" y="1104900"/>
+            <a:ext cx="0" cy="1054100"/>
+          </a:xfrm>
+          <a:prstGeom prst="straightConnector1">
+            <a:avLst/>
+          </a:prstGeom>
+          <a:ln w="19050">
+            <a:solidFill>
+              <a:schemeClr val="tx1"/>
+            </a:solidFill>
+            <a:tailEnd type="none"/>
+          </a:ln>
+        </p:spPr>
+        <p:style>
+          <a:lnRef idx="1">
+            <a:schemeClr val="accent1"/>
+          </a:lnRef>
+          <a:fillRef idx="0">
+            <a:schemeClr val="accent1"/>
+          </a:fillRef>
+          <a:effectRef idx="0">
+            <a:schemeClr val="accent1"/>
+          </a:effectRef>
+          <a:fontRef idx="minor">
+            <a:schemeClr val="tx1"/>
+          </a:fontRef>
+        </p:style>
+      </p:cxnSp>
+      <p:cxnSp>
+        <p:nvCxnSpPr>
+          <p:cNvPr id="20" name="Straight Arrow Connector 19">
+            <a:extLst>
+              <a:ext uri="{FF2B5EF4-FFF2-40B4-BE49-F238E27FC236}">
+                <a16:creationId xmlns:a16="http://schemas.microsoft.com/office/drawing/2014/main" id="{55EFC867-6772-4202-9EA4-38D1CB773016}"/>
+              </a:ext>
+            </a:extLst>
+          </p:cNvPr>
+          <p:cNvCxnSpPr>
+            <a:cxnSpLocks/>
+          </p:cNvCxnSpPr>
+          <p:nvPr/>
+        </p:nvCxnSpPr>
+        <p:spPr>
+          <a:xfrm flipH="1" flipV="1">
+            <a:off x="3016095" y="1104900"/>
+            <a:ext cx="6283605" cy="1"/>
+          </a:xfrm>
+          <a:prstGeom prst="straightConnector1">
+            <a:avLst/>
+          </a:prstGeom>
+          <a:ln w="19050">
+            <a:solidFill>
+              <a:schemeClr val="tx1"/>
+            </a:solidFill>
+            <a:tailEnd type="none"/>
+          </a:ln>
+        </p:spPr>
+        <p:style>
+          <a:lnRef idx="1">
+            <a:schemeClr val="accent1"/>
+          </a:lnRef>
+          <a:fillRef idx="0">
+            <a:schemeClr val="accent1"/>
+          </a:fillRef>
+          <a:effectRef idx="0">
+            <a:schemeClr val="accent1"/>
+          </a:effectRef>
+          <a:fontRef idx="minor">
+            <a:schemeClr val="tx1"/>
+          </a:fontRef>
+        </p:style>
+      </p:cxnSp>
+    </p:spTree>
+    <p:extLst>
+      <p:ext uri="{BB962C8B-B14F-4D97-AF65-F5344CB8AC3E}">
+        <p14:creationId xmlns:p14="http://schemas.microsoft.com/office/powerpoint/2010/main" val="818455099"/>
+      </p:ext>
+    </p:extLst>
+  </p:cSld>
+  <p:clrMapOvr>
+    <a:masterClrMapping/>
+  </p:clrMapOvr>
+</p:sld>
+</file>
+
+<file path=ppt/slides/slide7.xml><?xml version="1.0" encoding="utf-8"?>
+<p:sld xmlns:a="http://schemas.openxmlformats.org/drawingml/2006/main" xmlns:r="http://schemas.openxmlformats.org/officeDocument/2006/relationships" xmlns:p="http://schemas.openxmlformats.org/presentationml/2006/main">
+  <p:cSld>
+    <p:spTree>
+      <p:nvGrpSpPr>
+        <p:cNvPr id="1" name=""/>
+        <p:cNvGrpSpPr/>
+        <p:nvPr/>
+      </p:nvGrpSpPr>
+      <p:grpSpPr>
+        <a:xfrm>
+          <a:off x="0" y="0"/>
+          <a:ext cx="0" cy="0"/>
+          <a:chOff x="0" y="0"/>
+          <a:chExt cx="0" cy="0"/>
+        </a:xfrm>
+      </p:grpSpPr>
+      <p:pic>
+        <p:nvPicPr>
+          <p:cNvPr id="2" name="Picture 1">
+            <a:extLst>
+              <a:ext uri="{FF2B5EF4-FFF2-40B4-BE49-F238E27FC236}">
+                <a16:creationId xmlns:a16="http://schemas.microsoft.com/office/drawing/2014/main" id="{99343641-52F8-4265-8515-62AB7E29E72B}"/>
+              </a:ext>
+            </a:extLst>
+          </p:cNvPr>
+          <p:cNvPicPr/>
+          <p:nvPr/>
+        </p:nvPicPr>
+        <p:blipFill rotWithShape="1">
+          <a:blip r:embed="rId2">
+            <a:extLst>
+              <a:ext uri="{28A0092B-C50C-407E-A947-70E740481C1C}">
+                <a14:useLocalDpi xmlns:a14="http://schemas.microsoft.com/office/drawing/2010/main" val="0"/>
+              </a:ext>
+            </a:extLst>
+          </a:blip>
+          <a:srcRect b="7826"/>
+          <a:stretch/>
+        </p:blipFill>
+        <p:spPr bwMode="auto">
+          <a:xfrm>
+            <a:off x="3241357" y="2117090"/>
+            <a:ext cx="5709285" cy="2623820"/>
+          </a:xfrm>
+          <a:prstGeom prst="rect">
+            <a:avLst/>
+          </a:prstGeom>
+          <a:noFill/>
+          <a:ln>
+            <a:noFill/>
+          </a:ln>
+          <a:extLst>
+            <a:ext uri="{53640926-AAD7-44D8-BBD7-CCE9431645EC}">
+              <a14:shadowObscured xmlns:a14="http://schemas.microsoft.com/office/drawing/2010/main"/>
+            </a:ext>
+          </a:extLst>
+        </p:spPr>
+      </p:pic>
+      <p:pic>
+        <p:nvPicPr>
+          <p:cNvPr id="3" name="Picture 2">
+            <a:extLst>
+              <a:ext uri="{FF2B5EF4-FFF2-40B4-BE49-F238E27FC236}">
+                <a16:creationId xmlns:a16="http://schemas.microsoft.com/office/drawing/2014/main" id="{80C11542-1D46-47ED-86B3-E2E4C6E3D9A9}"/>
+              </a:ext>
+            </a:extLst>
+          </p:cNvPr>
+          <p:cNvPicPr/>
+          <p:nvPr/>
+        </p:nvPicPr>
+        <p:blipFill rotWithShape="1">
+          <a:blip r:embed="rId3">
+            <a:extLst>
+              <a:ext uri="{28A0092B-C50C-407E-A947-70E740481C1C}">
+                <a14:useLocalDpi xmlns:a14="http://schemas.microsoft.com/office/drawing/2010/main" val="0"/>
+              </a:ext>
+            </a:extLst>
+          </a:blip>
+          <a:srcRect t="81840" b="8662"/>
+          <a:stretch/>
+        </p:blipFill>
+        <p:spPr bwMode="auto">
+          <a:xfrm>
+            <a:off x="3241357" y="4740910"/>
+            <a:ext cx="5708015" cy="269875"/>
+          </a:xfrm>
+          <a:prstGeom prst="rect">
+            <a:avLst/>
+          </a:prstGeom>
+          <a:noFill/>
+          <a:ln>
+            <a:noFill/>
+          </a:ln>
+          <a:extLst>
+            <a:ext uri="{53640926-AAD7-44D8-BBD7-CCE9431645EC}">
+              <a14:shadowObscured xmlns:a14="http://schemas.microsoft.com/office/drawing/2010/main"/>
+            </a:ext>
+          </a:extLst>
+        </p:spPr>
+      </p:pic>
+    </p:spTree>
+    <p:extLst>
+      <p:ext uri="{BB962C8B-B14F-4D97-AF65-F5344CB8AC3E}">
+        <p14:creationId xmlns:p14="http://schemas.microsoft.com/office/powerpoint/2010/main" val="2484476164"/>
+      </p:ext>
+    </p:extLst>
+  </p:cSld>
+  <p:clrMapOvr>
+    <a:masterClrMapping/>
+  </p:clrMapOvr>
+</p:sld>
+</file>
+
+<file path=ppt/slides/slide8.xml><?xml version="1.0" encoding="utf-8"?>
+<p:sld xmlns:a="http://schemas.openxmlformats.org/drawingml/2006/main" xmlns:r="http://schemas.openxmlformats.org/officeDocument/2006/relationships" xmlns:p="http://schemas.openxmlformats.org/presentationml/2006/main">
+  <p:cSld>
+    <p:spTree>
+      <p:nvGrpSpPr>
+        <p:cNvPr id="1" name=""/>
+        <p:cNvGrpSpPr/>
+        <p:nvPr/>
+      </p:nvGrpSpPr>
+      <p:grpSpPr>
+        <a:xfrm>
+          <a:off x="0" y="0"/>
+          <a:ext cx="0" cy="0"/>
+          <a:chOff x="0" y="0"/>
+          <a:chExt cx="0" cy="0"/>
+        </a:xfrm>
+      </p:grpSpPr>
+    </p:spTree>
+    <p:extLst>
+      <p:ext uri="{BB962C8B-B14F-4D97-AF65-F5344CB8AC3E}">
+        <p14:creationId xmlns:p14="http://schemas.microsoft.com/office/powerpoint/2010/main" val="1304447067"/>
+      </p:ext>
+    </p:extLst>
+  </p:cSld>
+  <p:clrMapOvr>
+    <a:masterClrMapping/>
+  </p:clrMapOvr>
+</p:sld>
+</file>
+
+<file path=ppt/slides/slide9.xml><?xml version="1.0" encoding="utf-8"?>
+<p:sld xmlns:a="http://schemas.openxmlformats.org/drawingml/2006/main" xmlns:r="http://schemas.openxmlformats.org/officeDocument/2006/relationships" xmlns:p="http://schemas.openxmlformats.org/presentationml/2006/main">
+  <p:cSld>
+    <p:spTree>
+      <p:nvGrpSpPr>
+        <p:cNvPr id="1" name=""/>
+        <p:cNvGrpSpPr/>
+        <p:nvPr/>
+      </p:nvGrpSpPr>
+      <p:grpSpPr>
+        <a:xfrm>
+          <a:off x="0" y="0"/>
+          <a:ext cx="0" cy="0"/>
+          <a:chOff x="0" y="0"/>
+          <a:chExt cx="0" cy="0"/>
+        </a:xfrm>
+      </p:grpSpPr>
+    </p:spTree>
+    <p:extLst>
+      <p:ext uri="{BB962C8B-B14F-4D97-AF65-F5344CB8AC3E}">
+        <p14:creationId xmlns:p14="http://schemas.microsoft.com/office/powerpoint/2010/main" val="1216387676"/>
+      </p:ext>
+    </p:extLst>
+  </p:cSld>
+  <p:clrMapOvr>
+    <a:masterClrMapping/>
+  </p:clrMapOvr>
+</p:sld>
+</file>
+
 <file path=ppt/theme/theme1.xml><?xml version="1.0" encoding="utf-8"?>
 <a:theme xmlns:a="http://schemas.openxmlformats.org/drawingml/2006/main" name="Office Theme">
   <a:themeElements>

</xml_diff>